<commit_message>
[RM Ch04] Figure 4-3 updated source file
</commit_message>
<xml_diff>
--- a/doc/ref_model/figures/artefacts/RM-Ch-04-Workloads-Profiles-Flavours.pptx
+++ b/doc/ref_model/figures/artefacts/RM-Ch-04-Workloads-Profiles-Flavours.pptx
@@ -104,7 +104,369 @@
       </a:defRPr>
     </a:lvl9pPr>
   </p:defaultTextStyle>
+  <p:extLst>
+    <p:ext uri="{EFAFB233-063F-42B5-8137-9DF3F51BA10A}">
+      <p15:sldGuideLst xmlns:p15="http://schemas.microsoft.com/office/powerpoint/2012/main"/>
+    </p:ext>
+  </p:extLst>
 </p:presentation>
+</file>
+
+<file path=ppt/revisionInfo.xml><?xml version="1.0" encoding="utf-8"?>
+<p1510:revInfo xmlns:a="http://schemas.openxmlformats.org/drawingml/2006/main" xmlns:r="http://schemas.openxmlformats.org/officeDocument/2006/relationships" xmlns:p1510="http://schemas.microsoft.com/office/powerpoint/2015/10/main">
+  <p1510:revLst>
+    <p1510:client id="{0E94D3DF-FF4B-4501-9D0C-3B140E6ECC85}" v="9" dt="2021-05-03T17:55:17.951"/>
+  </p1510:revLst>
+</p1510:revInfo>
+</file>
+
+<file path=ppt/changesInfos/changesInfo1.xml><?xml version="1.0" encoding="utf-8"?>
+<pc:chgInfo xmlns:a="http://schemas.openxmlformats.org/drawingml/2006/main" xmlns:r="http://schemas.openxmlformats.org/officeDocument/2006/relationships" xmlns:ac="http://schemas.microsoft.com/office/drawing/2013/main/command" xmlns:pc="http://schemas.microsoft.com/office/powerpoint/2013/main/command">
+  <pc:docChgLst>
+    <pc:chgData name="GOYAL, PANKAJ" userId="89a7a907-3f17-47e2-a926-8cb9790a653b" providerId="ADAL" clId="{0E94D3DF-FF4B-4501-9D0C-3B140E6ECC85}"/>
+    <pc:docChg chg="modSld">
+      <pc:chgData name="GOYAL, PANKAJ" userId="89a7a907-3f17-47e2-a926-8cb9790a653b" providerId="ADAL" clId="{0E94D3DF-FF4B-4501-9D0C-3B140E6ECC85}" dt="2021-05-03T17:55:17.951" v="8"/>
+      <pc:docMkLst>
+        <pc:docMk/>
+      </pc:docMkLst>
+      <pc:sldChg chg="addSp modSp">
+        <pc:chgData name="GOYAL, PANKAJ" userId="89a7a907-3f17-47e2-a926-8cb9790a653b" providerId="ADAL" clId="{0E94D3DF-FF4B-4501-9D0C-3B140E6ECC85}" dt="2021-05-03T17:55:17.951" v="8"/>
+        <pc:sldMkLst>
+          <pc:docMk/>
+          <pc:sldMk cId="3397154744" sldId="256"/>
+        </pc:sldMkLst>
+        <pc:spChg chg="add mod">
+          <ac:chgData name="GOYAL, PANKAJ" userId="89a7a907-3f17-47e2-a926-8cb9790a653b" providerId="ADAL" clId="{0E94D3DF-FF4B-4501-9D0C-3B140E6ECC85}" dt="2021-05-03T17:55:17.951" v="8"/>
+          <ac:spMkLst>
+            <pc:docMk/>
+            <pc:sldMk cId="3397154744" sldId="256"/>
+            <ac:spMk id="2" creationId="{E0F5FB46-05A4-4547-8A38-FA5BDAB3ACB1}"/>
+          </ac:spMkLst>
+        </pc:spChg>
+        <pc:spChg chg="mod">
+          <ac:chgData name="GOYAL, PANKAJ" userId="89a7a907-3f17-47e2-a926-8cb9790a653b" providerId="ADAL" clId="{0E94D3DF-FF4B-4501-9D0C-3B140E6ECC85}" dt="2021-05-03T17:52:50.185" v="4" actId="12788"/>
+          <ac:spMkLst>
+            <pc:docMk/>
+            <pc:sldMk cId="3397154744" sldId="256"/>
+            <ac:spMk id="4" creationId="{CE0F36DB-0268-4586-8661-C8F9DA2075C0}"/>
+          </ac:spMkLst>
+        </pc:spChg>
+        <pc:spChg chg="mod">
+          <ac:chgData name="GOYAL, PANKAJ" userId="89a7a907-3f17-47e2-a926-8cb9790a653b" providerId="ADAL" clId="{0E94D3DF-FF4B-4501-9D0C-3B140E6ECC85}" dt="2021-05-03T17:52:50.185" v="4" actId="12788"/>
+          <ac:spMkLst>
+            <pc:docMk/>
+            <pc:sldMk cId="3397154744" sldId="256"/>
+            <ac:spMk id="7" creationId="{1F9F574D-8969-4393-AE5B-BBC80FCD5BB6}"/>
+          </ac:spMkLst>
+        </pc:spChg>
+        <pc:spChg chg="mod">
+          <ac:chgData name="GOYAL, PANKAJ" userId="89a7a907-3f17-47e2-a926-8cb9790a653b" providerId="ADAL" clId="{0E94D3DF-FF4B-4501-9D0C-3B140E6ECC85}" dt="2021-05-03T17:52:50.185" v="4" actId="12788"/>
+          <ac:spMkLst>
+            <pc:docMk/>
+            <pc:sldMk cId="3397154744" sldId="256"/>
+            <ac:spMk id="12" creationId="{83112053-1C21-499D-A3D2-F6BABB2B34A5}"/>
+          </ac:spMkLst>
+        </pc:spChg>
+        <pc:spChg chg="mod">
+          <ac:chgData name="GOYAL, PANKAJ" userId="89a7a907-3f17-47e2-a926-8cb9790a653b" providerId="ADAL" clId="{0E94D3DF-FF4B-4501-9D0C-3B140E6ECC85}" dt="2021-05-03T17:52:50.185" v="4" actId="12788"/>
+          <ac:spMkLst>
+            <pc:docMk/>
+            <pc:sldMk cId="3397154744" sldId="256"/>
+            <ac:spMk id="14" creationId="{0DD1A00C-9CF3-4928-B4A5-98A0F21A2109}"/>
+          </ac:spMkLst>
+        </pc:spChg>
+        <pc:spChg chg="mod">
+          <ac:chgData name="GOYAL, PANKAJ" userId="89a7a907-3f17-47e2-a926-8cb9790a653b" providerId="ADAL" clId="{0E94D3DF-FF4B-4501-9D0C-3B140E6ECC85}" dt="2021-05-03T17:52:50.185" v="4" actId="12788"/>
+          <ac:spMkLst>
+            <pc:docMk/>
+            <pc:sldMk cId="3397154744" sldId="256"/>
+            <ac:spMk id="15" creationId="{69E5DC8C-A955-45E5-8766-0BC54929F644}"/>
+          </ac:spMkLst>
+        </pc:spChg>
+        <pc:spChg chg="mod">
+          <ac:chgData name="GOYAL, PANKAJ" userId="89a7a907-3f17-47e2-a926-8cb9790a653b" providerId="ADAL" clId="{0E94D3DF-FF4B-4501-9D0C-3B140E6ECC85}" dt="2021-05-03T17:52:50.185" v="4" actId="12788"/>
+          <ac:spMkLst>
+            <pc:docMk/>
+            <pc:sldMk cId="3397154744" sldId="256"/>
+            <ac:spMk id="18" creationId="{F14696B2-9979-4F93-B0B7-C31CCFAAD07B}"/>
+          </ac:spMkLst>
+        </pc:spChg>
+        <pc:spChg chg="mod">
+          <ac:chgData name="GOYAL, PANKAJ" userId="89a7a907-3f17-47e2-a926-8cb9790a653b" providerId="ADAL" clId="{0E94D3DF-FF4B-4501-9D0C-3B140E6ECC85}" dt="2021-05-03T17:51:42.532" v="2"/>
+          <ac:spMkLst>
+            <pc:docMk/>
+            <pc:sldMk cId="3397154744" sldId="256"/>
+            <ac:spMk id="34" creationId="{AA1A46C1-1AAA-48A5-B047-D930210E6265}"/>
+          </ac:spMkLst>
+        </pc:spChg>
+        <pc:spChg chg="mod">
+          <ac:chgData name="GOYAL, PANKAJ" userId="89a7a907-3f17-47e2-a926-8cb9790a653b" providerId="ADAL" clId="{0E94D3DF-FF4B-4501-9D0C-3B140E6ECC85}" dt="2021-05-03T17:51:42.532" v="2"/>
+          <ac:spMkLst>
+            <pc:docMk/>
+            <pc:sldMk cId="3397154744" sldId="256"/>
+            <ac:spMk id="35" creationId="{B7A93B70-E43E-4C7E-9760-9ADE203267CA}"/>
+          </ac:spMkLst>
+        </pc:spChg>
+        <pc:spChg chg="mod">
+          <ac:chgData name="GOYAL, PANKAJ" userId="89a7a907-3f17-47e2-a926-8cb9790a653b" providerId="ADAL" clId="{0E94D3DF-FF4B-4501-9D0C-3B140E6ECC85}" dt="2021-05-03T17:51:42.532" v="2"/>
+          <ac:spMkLst>
+            <pc:docMk/>
+            <pc:sldMk cId="3397154744" sldId="256"/>
+            <ac:spMk id="38" creationId="{EB8D7C22-A774-41AE-B060-472801628920}"/>
+          </ac:spMkLst>
+        </pc:spChg>
+        <pc:spChg chg="mod">
+          <ac:chgData name="GOYAL, PANKAJ" userId="89a7a907-3f17-47e2-a926-8cb9790a653b" providerId="ADAL" clId="{0E94D3DF-FF4B-4501-9D0C-3B140E6ECC85}" dt="2021-05-03T17:51:42.532" v="2"/>
+          <ac:spMkLst>
+            <pc:docMk/>
+            <pc:sldMk cId="3397154744" sldId="256"/>
+            <ac:spMk id="40" creationId="{943EE860-28C7-47DD-933B-81B00B7FE71C}"/>
+          </ac:spMkLst>
+        </pc:spChg>
+        <pc:spChg chg="mod">
+          <ac:chgData name="GOYAL, PANKAJ" userId="89a7a907-3f17-47e2-a926-8cb9790a653b" providerId="ADAL" clId="{0E94D3DF-FF4B-4501-9D0C-3B140E6ECC85}" dt="2021-05-03T17:51:42.532" v="2"/>
+          <ac:spMkLst>
+            <pc:docMk/>
+            <pc:sldMk cId="3397154744" sldId="256"/>
+            <ac:spMk id="41" creationId="{B5E6811B-1776-4DFB-9EBC-B50625D0CF9C}"/>
+          </ac:spMkLst>
+        </pc:spChg>
+        <pc:spChg chg="mod">
+          <ac:chgData name="GOYAL, PANKAJ" userId="89a7a907-3f17-47e2-a926-8cb9790a653b" providerId="ADAL" clId="{0E94D3DF-FF4B-4501-9D0C-3B140E6ECC85}" dt="2021-05-03T17:51:42.532" v="2"/>
+          <ac:spMkLst>
+            <pc:docMk/>
+            <pc:sldMk cId="3397154744" sldId="256"/>
+            <ac:spMk id="42" creationId="{534C69EB-EBAE-401B-AE92-5E2DCAC1FD4C}"/>
+          </ac:spMkLst>
+        </pc:spChg>
+        <pc:spChg chg="mod">
+          <ac:chgData name="GOYAL, PANKAJ" userId="89a7a907-3f17-47e2-a926-8cb9790a653b" providerId="ADAL" clId="{0E94D3DF-FF4B-4501-9D0C-3B140E6ECC85}" dt="2021-05-03T17:51:47.395" v="3"/>
+          <ac:spMkLst>
+            <pc:docMk/>
+            <pc:sldMk cId="3397154744" sldId="256"/>
+            <ac:spMk id="44" creationId="{7B0211AF-9707-4B23-A5E3-600D43BFDC1D}"/>
+          </ac:spMkLst>
+        </pc:spChg>
+        <pc:spChg chg="mod">
+          <ac:chgData name="GOYAL, PANKAJ" userId="89a7a907-3f17-47e2-a926-8cb9790a653b" providerId="ADAL" clId="{0E94D3DF-FF4B-4501-9D0C-3B140E6ECC85}" dt="2021-05-03T17:51:47.395" v="3"/>
+          <ac:spMkLst>
+            <pc:docMk/>
+            <pc:sldMk cId="3397154744" sldId="256"/>
+            <ac:spMk id="45" creationId="{183604B6-3E09-4DE9-88AC-30E335A31C4D}"/>
+          </ac:spMkLst>
+        </pc:spChg>
+        <pc:spChg chg="mod">
+          <ac:chgData name="GOYAL, PANKAJ" userId="89a7a907-3f17-47e2-a926-8cb9790a653b" providerId="ADAL" clId="{0E94D3DF-FF4B-4501-9D0C-3B140E6ECC85}" dt="2021-05-03T17:51:47.395" v="3"/>
+          <ac:spMkLst>
+            <pc:docMk/>
+            <pc:sldMk cId="3397154744" sldId="256"/>
+            <ac:spMk id="46" creationId="{BB1DA13D-FF67-4B22-8657-C7B818120E40}"/>
+          </ac:spMkLst>
+        </pc:spChg>
+        <pc:spChg chg="mod">
+          <ac:chgData name="GOYAL, PANKAJ" userId="89a7a907-3f17-47e2-a926-8cb9790a653b" providerId="ADAL" clId="{0E94D3DF-FF4B-4501-9D0C-3B140E6ECC85}" dt="2021-05-03T17:51:47.395" v="3"/>
+          <ac:spMkLst>
+            <pc:docMk/>
+            <pc:sldMk cId="3397154744" sldId="256"/>
+            <ac:spMk id="48" creationId="{CC109C34-76E5-4D73-8F09-019958AB4399}"/>
+          </ac:spMkLst>
+        </pc:spChg>
+        <pc:spChg chg="mod">
+          <ac:chgData name="GOYAL, PANKAJ" userId="89a7a907-3f17-47e2-a926-8cb9790a653b" providerId="ADAL" clId="{0E94D3DF-FF4B-4501-9D0C-3B140E6ECC85}" dt="2021-05-03T17:51:47.395" v="3"/>
+          <ac:spMkLst>
+            <pc:docMk/>
+            <pc:sldMk cId="3397154744" sldId="256"/>
+            <ac:spMk id="49" creationId="{D54EF074-4335-4808-8867-1ACA1E5E5CDD}"/>
+          </ac:spMkLst>
+        </pc:spChg>
+        <pc:spChg chg="mod">
+          <ac:chgData name="GOYAL, PANKAJ" userId="89a7a907-3f17-47e2-a926-8cb9790a653b" providerId="ADAL" clId="{0E94D3DF-FF4B-4501-9D0C-3B140E6ECC85}" dt="2021-05-03T17:51:47.395" v="3"/>
+          <ac:spMkLst>
+            <pc:docMk/>
+            <pc:sldMk cId="3397154744" sldId="256"/>
+            <ac:spMk id="50" creationId="{20D35840-2A25-424F-AEE9-1D76D0C2C581}"/>
+          </ac:spMkLst>
+        </pc:spChg>
+        <pc:spChg chg="mod">
+          <ac:chgData name="GOYAL, PANKAJ" userId="89a7a907-3f17-47e2-a926-8cb9790a653b" providerId="ADAL" clId="{0E94D3DF-FF4B-4501-9D0C-3B140E6ECC85}" dt="2021-05-03T17:52:58.773" v="5"/>
+          <ac:spMkLst>
+            <pc:docMk/>
+            <pc:sldMk cId="3397154744" sldId="256"/>
+            <ac:spMk id="52" creationId="{593AA9A5-2B3D-48E4-A9A1-FC100370B1BC}"/>
+          </ac:spMkLst>
+        </pc:spChg>
+        <pc:spChg chg="mod">
+          <ac:chgData name="GOYAL, PANKAJ" userId="89a7a907-3f17-47e2-a926-8cb9790a653b" providerId="ADAL" clId="{0E94D3DF-FF4B-4501-9D0C-3B140E6ECC85}" dt="2021-05-03T17:52:58.773" v="5"/>
+          <ac:spMkLst>
+            <pc:docMk/>
+            <pc:sldMk cId="3397154744" sldId="256"/>
+            <ac:spMk id="53" creationId="{9E881242-1BA1-4BA1-A9BD-288F9550FF55}"/>
+          </ac:spMkLst>
+        </pc:spChg>
+        <pc:spChg chg="mod">
+          <ac:chgData name="GOYAL, PANKAJ" userId="89a7a907-3f17-47e2-a926-8cb9790a653b" providerId="ADAL" clId="{0E94D3DF-FF4B-4501-9D0C-3B140E6ECC85}" dt="2021-05-03T17:52:58.773" v="5"/>
+          <ac:spMkLst>
+            <pc:docMk/>
+            <pc:sldMk cId="3397154744" sldId="256"/>
+            <ac:spMk id="54" creationId="{8F1D4D6A-E82C-441F-85C7-3D9DCB9F9C93}"/>
+          </ac:spMkLst>
+        </pc:spChg>
+        <pc:spChg chg="mod">
+          <ac:chgData name="GOYAL, PANKAJ" userId="89a7a907-3f17-47e2-a926-8cb9790a653b" providerId="ADAL" clId="{0E94D3DF-FF4B-4501-9D0C-3B140E6ECC85}" dt="2021-05-03T17:52:58.773" v="5"/>
+          <ac:spMkLst>
+            <pc:docMk/>
+            <pc:sldMk cId="3397154744" sldId="256"/>
+            <ac:spMk id="56" creationId="{5C0924E5-1CC4-484F-8CE8-627F67DC3EDE}"/>
+          </ac:spMkLst>
+        </pc:spChg>
+        <pc:spChg chg="mod">
+          <ac:chgData name="GOYAL, PANKAJ" userId="89a7a907-3f17-47e2-a926-8cb9790a653b" providerId="ADAL" clId="{0E94D3DF-FF4B-4501-9D0C-3B140E6ECC85}" dt="2021-05-03T17:52:58.773" v="5"/>
+          <ac:spMkLst>
+            <pc:docMk/>
+            <pc:sldMk cId="3397154744" sldId="256"/>
+            <ac:spMk id="57" creationId="{F7E91761-291A-4FAB-AD93-FF2E3B2F7182}"/>
+          </ac:spMkLst>
+        </pc:spChg>
+        <pc:spChg chg="mod">
+          <ac:chgData name="GOYAL, PANKAJ" userId="89a7a907-3f17-47e2-a926-8cb9790a653b" providerId="ADAL" clId="{0E94D3DF-FF4B-4501-9D0C-3B140E6ECC85}" dt="2021-05-03T17:52:58.773" v="5"/>
+          <ac:spMkLst>
+            <pc:docMk/>
+            <pc:sldMk cId="3397154744" sldId="256"/>
+            <ac:spMk id="58" creationId="{5673AFD6-428C-463B-BC79-C1959890BD38}"/>
+          </ac:spMkLst>
+        </pc:spChg>
+        <pc:spChg chg="mod">
+          <ac:chgData name="GOYAL, PANKAJ" userId="89a7a907-3f17-47e2-a926-8cb9790a653b" providerId="ADAL" clId="{0E94D3DF-FF4B-4501-9D0C-3B140E6ECC85}" dt="2021-05-03T17:53:02.985" v="6"/>
+          <ac:spMkLst>
+            <pc:docMk/>
+            <pc:sldMk cId="3397154744" sldId="256"/>
+            <ac:spMk id="60" creationId="{CF00B967-2B04-4D2C-A9A3-140CDD36897F}"/>
+          </ac:spMkLst>
+        </pc:spChg>
+        <pc:spChg chg="mod">
+          <ac:chgData name="GOYAL, PANKAJ" userId="89a7a907-3f17-47e2-a926-8cb9790a653b" providerId="ADAL" clId="{0E94D3DF-FF4B-4501-9D0C-3B140E6ECC85}" dt="2021-05-03T17:53:02.985" v="6"/>
+          <ac:spMkLst>
+            <pc:docMk/>
+            <pc:sldMk cId="3397154744" sldId="256"/>
+            <ac:spMk id="61" creationId="{2D3CB07B-9248-4815-BB38-5CAD2130BFCA}"/>
+          </ac:spMkLst>
+        </pc:spChg>
+        <pc:spChg chg="mod">
+          <ac:chgData name="GOYAL, PANKAJ" userId="89a7a907-3f17-47e2-a926-8cb9790a653b" providerId="ADAL" clId="{0E94D3DF-FF4B-4501-9D0C-3B140E6ECC85}" dt="2021-05-03T17:53:02.985" v="6"/>
+          <ac:spMkLst>
+            <pc:docMk/>
+            <pc:sldMk cId="3397154744" sldId="256"/>
+            <ac:spMk id="62" creationId="{2B100C28-5587-49C7-B9A0-78DF12FCB765}"/>
+          </ac:spMkLst>
+        </pc:spChg>
+        <pc:spChg chg="mod">
+          <ac:chgData name="GOYAL, PANKAJ" userId="89a7a907-3f17-47e2-a926-8cb9790a653b" providerId="ADAL" clId="{0E94D3DF-FF4B-4501-9D0C-3B140E6ECC85}" dt="2021-05-03T17:53:02.985" v="6"/>
+          <ac:spMkLst>
+            <pc:docMk/>
+            <pc:sldMk cId="3397154744" sldId="256"/>
+            <ac:spMk id="64" creationId="{6C138C2D-A53E-41CE-9818-E4A36AB93DD9}"/>
+          </ac:spMkLst>
+        </pc:spChg>
+        <pc:spChg chg="mod">
+          <ac:chgData name="GOYAL, PANKAJ" userId="89a7a907-3f17-47e2-a926-8cb9790a653b" providerId="ADAL" clId="{0E94D3DF-FF4B-4501-9D0C-3B140E6ECC85}" dt="2021-05-03T17:53:02.985" v="6"/>
+          <ac:spMkLst>
+            <pc:docMk/>
+            <pc:sldMk cId="3397154744" sldId="256"/>
+            <ac:spMk id="65" creationId="{EED90C21-4969-46B8-835E-4C0CA5F2C9D3}"/>
+          </ac:spMkLst>
+        </pc:spChg>
+        <pc:spChg chg="mod">
+          <ac:chgData name="GOYAL, PANKAJ" userId="89a7a907-3f17-47e2-a926-8cb9790a653b" providerId="ADAL" clId="{0E94D3DF-FF4B-4501-9D0C-3B140E6ECC85}" dt="2021-05-03T17:53:02.985" v="6"/>
+          <ac:spMkLst>
+            <pc:docMk/>
+            <pc:sldMk cId="3397154744" sldId="256"/>
+            <ac:spMk id="66" creationId="{F45E0822-4448-4274-B954-1706F03CDD16}"/>
+          </ac:spMkLst>
+        </pc:spChg>
+        <pc:grpChg chg="mod">
+          <ac:chgData name="GOYAL, PANKAJ" userId="89a7a907-3f17-47e2-a926-8cb9790a653b" providerId="ADAL" clId="{0E94D3DF-FF4B-4501-9D0C-3B140E6ECC85}" dt="2021-05-03T17:52:50.185" v="4" actId="12788"/>
+          <ac:grpSpMkLst>
+            <pc:docMk/>
+            <pc:sldMk cId="3397154744" sldId="256"/>
+            <ac:grpSpMk id="19" creationId="{5D0DE612-3109-4B1E-970B-B7FF4E7EA0DE}"/>
+          </ac:grpSpMkLst>
+        </pc:grpChg>
+        <pc:grpChg chg="mod">
+          <ac:chgData name="GOYAL, PANKAJ" userId="89a7a907-3f17-47e2-a926-8cb9790a653b" providerId="ADAL" clId="{0E94D3DF-FF4B-4501-9D0C-3B140E6ECC85}" dt="2021-05-03T17:52:50.185" v="4" actId="12788"/>
+          <ac:grpSpMkLst>
+            <pc:docMk/>
+            <pc:sldMk cId="3397154744" sldId="256"/>
+            <ac:grpSpMk id="28" creationId="{AD9AC509-6D40-40E4-90AD-470A53124BF7}"/>
+          </ac:grpSpMkLst>
+        </pc:grpChg>
+        <pc:grpChg chg="add mod">
+          <ac:chgData name="GOYAL, PANKAJ" userId="89a7a907-3f17-47e2-a926-8cb9790a653b" providerId="ADAL" clId="{0E94D3DF-FF4B-4501-9D0C-3B140E6ECC85}" dt="2021-05-03T17:51:42.532" v="2"/>
+          <ac:grpSpMkLst>
+            <pc:docMk/>
+            <pc:sldMk cId="3397154744" sldId="256"/>
+            <ac:grpSpMk id="33" creationId="{297FFCF9-1991-4F6E-81DA-E66D53037D5B}"/>
+          </ac:grpSpMkLst>
+        </pc:grpChg>
+        <pc:grpChg chg="mod">
+          <ac:chgData name="GOYAL, PANKAJ" userId="89a7a907-3f17-47e2-a926-8cb9790a653b" providerId="ADAL" clId="{0E94D3DF-FF4B-4501-9D0C-3B140E6ECC85}" dt="2021-05-03T17:51:42.532" v="2"/>
+          <ac:grpSpMkLst>
+            <pc:docMk/>
+            <pc:sldMk cId="3397154744" sldId="256"/>
+            <ac:grpSpMk id="39" creationId="{4A549E5E-A86A-48BB-A44B-787ED9F5B793}"/>
+          </ac:grpSpMkLst>
+        </pc:grpChg>
+        <pc:grpChg chg="add mod">
+          <ac:chgData name="GOYAL, PANKAJ" userId="89a7a907-3f17-47e2-a926-8cb9790a653b" providerId="ADAL" clId="{0E94D3DF-FF4B-4501-9D0C-3B140E6ECC85}" dt="2021-05-03T17:51:47.395" v="3"/>
+          <ac:grpSpMkLst>
+            <pc:docMk/>
+            <pc:sldMk cId="3397154744" sldId="256"/>
+            <ac:grpSpMk id="43" creationId="{2304130C-47F0-414E-8F3C-A2F6BF579674}"/>
+          </ac:grpSpMkLst>
+        </pc:grpChg>
+        <pc:grpChg chg="mod">
+          <ac:chgData name="GOYAL, PANKAJ" userId="89a7a907-3f17-47e2-a926-8cb9790a653b" providerId="ADAL" clId="{0E94D3DF-FF4B-4501-9D0C-3B140E6ECC85}" dt="2021-05-03T17:51:47.395" v="3"/>
+          <ac:grpSpMkLst>
+            <pc:docMk/>
+            <pc:sldMk cId="3397154744" sldId="256"/>
+            <ac:grpSpMk id="47" creationId="{918FD446-DCE5-4A19-95AC-1E7982A7D7EA}"/>
+          </ac:grpSpMkLst>
+        </pc:grpChg>
+        <pc:grpChg chg="add mod">
+          <ac:chgData name="GOYAL, PANKAJ" userId="89a7a907-3f17-47e2-a926-8cb9790a653b" providerId="ADAL" clId="{0E94D3DF-FF4B-4501-9D0C-3B140E6ECC85}" dt="2021-05-03T17:52:58.773" v="5"/>
+          <ac:grpSpMkLst>
+            <pc:docMk/>
+            <pc:sldMk cId="3397154744" sldId="256"/>
+            <ac:grpSpMk id="51" creationId="{EB3F28A7-1A7E-449E-AD4F-AA7372D23C6F}"/>
+          </ac:grpSpMkLst>
+        </pc:grpChg>
+        <pc:grpChg chg="mod">
+          <ac:chgData name="GOYAL, PANKAJ" userId="89a7a907-3f17-47e2-a926-8cb9790a653b" providerId="ADAL" clId="{0E94D3DF-FF4B-4501-9D0C-3B140E6ECC85}" dt="2021-05-03T17:52:58.773" v="5"/>
+          <ac:grpSpMkLst>
+            <pc:docMk/>
+            <pc:sldMk cId="3397154744" sldId="256"/>
+            <ac:grpSpMk id="55" creationId="{AEF79EB9-C7D3-4B98-A9C0-4A54C562541A}"/>
+          </ac:grpSpMkLst>
+        </pc:grpChg>
+        <pc:grpChg chg="add mod">
+          <ac:chgData name="GOYAL, PANKAJ" userId="89a7a907-3f17-47e2-a926-8cb9790a653b" providerId="ADAL" clId="{0E94D3DF-FF4B-4501-9D0C-3B140E6ECC85}" dt="2021-05-03T17:53:02.985" v="6"/>
+          <ac:grpSpMkLst>
+            <pc:docMk/>
+            <pc:sldMk cId="3397154744" sldId="256"/>
+            <ac:grpSpMk id="59" creationId="{5E2954F3-3001-414A-9349-39D0F69BCAC1}"/>
+          </ac:grpSpMkLst>
+        </pc:grpChg>
+        <pc:grpChg chg="mod">
+          <ac:chgData name="GOYAL, PANKAJ" userId="89a7a907-3f17-47e2-a926-8cb9790a653b" providerId="ADAL" clId="{0E94D3DF-FF4B-4501-9D0C-3B140E6ECC85}" dt="2021-05-03T17:53:02.985" v="6"/>
+          <ac:grpSpMkLst>
+            <pc:docMk/>
+            <pc:sldMk cId="3397154744" sldId="256"/>
+            <ac:grpSpMk id="63" creationId="{F1698988-0FDC-4C64-B196-0498B5646902}"/>
+          </ac:grpSpMkLst>
+        </pc:grpChg>
+      </pc:sldChg>
+    </pc:docChg>
+  </pc:docChgLst>
+</pc:chgInfo>
 </file>
 
 <file path=ppt/slideLayouts/slideLayout1.xml><?xml version="1.0" encoding="utf-8"?>
@@ -254,7 +616,7 @@
           <a:p>
             <a:fld id="{84D2E146-2C3C-4EA6-950A-AE99727839C5}" type="datetimeFigureOut">
               <a:rPr lang="en-US" smtClean="0"/>
-              <a:t>4/25/2021</a:t>
+              <a:t>5/3/2021</a:t>
             </a:fld>
             <a:endParaRPr lang="en-US"/>
           </a:p>
@@ -452,7 +814,7 @@
           <a:p>
             <a:fld id="{84D2E146-2C3C-4EA6-950A-AE99727839C5}" type="datetimeFigureOut">
               <a:rPr lang="en-US" smtClean="0"/>
-              <a:t>4/25/2021</a:t>
+              <a:t>5/3/2021</a:t>
             </a:fld>
             <a:endParaRPr lang="en-US"/>
           </a:p>
@@ -660,7 +1022,7 @@
           <a:p>
             <a:fld id="{84D2E146-2C3C-4EA6-950A-AE99727839C5}" type="datetimeFigureOut">
               <a:rPr lang="en-US" smtClean="0"/>
-              <a:t>4/25/2021</a:t>
+              <a:t>5/3/2021</a:t>
             </a:fld>
             <a:endParaRPr lang="en-US"/>
           </a:p>
@@ -858,7 +1220,7 @@
           <a:p>
             <a:fld id="{84D2E146-2C3C-4EA6-950A-AE99727839C5}" type="datetimeFigureOut">
               <a:rPr lang="en-US" smtClean="0"/>
-              <a:t>4/25/2021</a:t>
+              <a:t>5/3/2021</a:t>
             </a:fld>
             <a:endParaRPr lang="en-US"/>
           </a:p>
@@ -1133,7 +1495,7 @@
           <a:p>
             <a:fld id="{84D2E146-2C3C-4EA6-950A-AE99727839C5}" type="datetimeFigureOut">
               <a:rPr lang="en-US" smtClean="0"/>
-              <a:t>4/25/2021</a:t>
+              <a:t>5/3/2021</a:t>
             </a:fld>
             <a:endParaRPr lang="en-US"/>
           </a:p>
@@ -1398,7 +1760,7 @@
           <a:p>
             <a:fld id="{84D2E146-2C3C-4EA6-950A-AE99727839C5}" type="datetimeFigureOut">
               <a:rPr lang="en-US" smtClean="0"/>
-              <a:t>4/25/2021</a:t>
+              <a:t>5/3/2021</a:t>
             </a:fld>
             <a:endParaRPr lang="en-US"/>
           </a:p>
@@ -1810,7 +2172,7 @@
           <a:p>
             <a:fld id="{84D2E146-2C3C-4EA6-950A-AE99727839C5}" type="datetimeFigureOut">
               <a:rPr lang="en-US" smtClean="0"/>
-              <a:t>4/25/2021</a:t>
+              <a:t>5/3/2021</a:t>
             </a:fld>
             <a:endParaRPr lang="en-US"/>
           </a:p>
@@ -1951,7 +2313,7 @@
           <a:p>
             <a:fld id="{84D2E146-2C3C-4EA6-950A-AE99727839C5}" type="datetimeFigureOut">
               <a:rPr lang="en-US" smtClean="0"/>
-              <a:t>4/25/2021</a:t>
+              <a:t>5/3/2021</a:t>
             </a:fld>
             <a:endParaRPr lang="en-US"/>
           </a:p>
@@ -2064,7 +2426,7 @@
           <a:p>
             <a:fld id="{84D2E146-2C3C-4EA6-950A-AE99727839C5}" type="datetimeFigureOut">
               <a:rPr lang="en-US" smtClean="0"/>
-              <a:t>4/25/2021</a:t>
+              <a:t>5/3/2021</a:t>
             </a:fld>
             <a:endParaRPr lang="en-US"/>
           </a:p>
@@ -2375,7 +2737,7 @@
           <a:p>
             <a:fld id="{84D2E146-2C3C-4EA6-950A-AE99727839C5}" type="datetimeFigureOut">
               <a:rPr lang="en-US" smtClean="0"/>
-              <a:t>4/25/2021</a:t>
+              <a:t>5/3/2021</a:t>
             </a:fld>
             <a:endParaRPr lang="en-US"/>
           </a:p>
@@ -2663,7 +3025,7 @@
           <a:p>
             <a:fld id="{84D2E146-2C3C-4EA6-950A-AE99727839C5}" type="datetimeFigureOut">
               <a:rPr lang="en-US" smtClean="0"/>
-              <a:t>4/25/2021</a:t>
+              <a:t>5/3/2021</a:t>
             </a:fld>
             <a:endParaRPr lang="en-US"/>
           </a:p>
@@ -2904,7 +3266,7 @@
           <a:p>
             <a:fld id="{84D2E146-2C3C-4EA6-950A-AE99727839C5}" type="datetimeFigureOut">
               <a:rPr lang="en-US" smtClean="0"/>
-              <a:t>4/25/2021</a:t>
+              <a:t>5/3/2021</a:t>
             </a:fld>
             <a:endParaRPr lang="en-US"/>
           </a:p>
@@ -3335,7 +3697,7 @@
         </p:nvGrpSpPr>
         <p:grpSpPr>
           <a:xfrm>
-            <a:off x="2443942" y="2530532"/>
+            <a:off x="1973042" y="2501779"/>
             <a:ext cx="1878676" cy="2759826"/>
             <a:chOff x="2443942" y="2530532"/>
             <a:chExt cx="1878676" cy="2759826"/>
@@ -3477,10 +3839,10 @@
           </p:nvGrpSpPr>
           <p:grpSpPr>
             <a:xfrm>
-              <a:off x="2915596" y="3563391"/>
-              <a:ext cx="935369" cy="964277"/>
-              <a:chOff x="329769" y="1695796"/>
-              <a:chExt cx="935369" cy="964277"/>
+              <a:off x="2592433" y="3563391"/>
+              <a:ext cx="1581694" cy="1036114"/>
+              <a:chOff x="6606" y="1695796"/>
+              <a:chExt cx="1581694" cy="1036114"/>
             </a:xfrm>
           </p:grpSpPr>
           <p:sp>
@@ -3497,8 +3859,8 @@
             </p:nvSpPr>
             <p:spPr>
               <a:xfrm>
-                <a:off x="329769" y="1695796"/>
-                <a:ext cx="935369" cy="964277"/>
+                <a:off x="6606" y="1695796"/>
+                <a:ext cx="1581694" cy="1036114"/>
               </a:xfrm>
               <a:prstGeom prst="rect">
                 <a:avLst/>
@@ -3549,7 +3911,7 @@
             </p:nvSpPr>
             <p:spPr>
               <a:xfrm>
-                <a:off x="576078" y="2222755"/>
+                <a:off x="576078" y="2359362"/>
                 <a:ext cx="442750" cy="307777"/>
               </a:xfrm>
               <a:prstGeom prst="rect">
@@ -3589,8 +3951,8 @@
             </p:nvSpPr>
             <p:spPr>
               <a:xfrm>
-                <a:off x="427801" y="1837494"/>
-                <a:ext cx="739305" cy="307777"/>
+                <a:off x="243455" y="1771372"/>
+                <a:ext cx="1107996" cy="523220"/>
               </a:xfrm>
               <a:prstGeom prst="rect">
                 <a:avLst/>
@@ -3610,19 +3972,180 @@
               <a:p>
                 <a:r>
                   <a:rPr lang="en-US" sz="1400" dirty="0"/>
-                  <a:t>  Small  </a:t>
+                  <a:t>  </a:t>
                 </a:r>
+                <a:r>
+                  <a:rPr lang="nb-NO" sz="1400" dirty="0"/>
+                  <a:t>{c: 2; r: 4; </a:t>
+                </a:r>
+              </a:p>
+              <a:p>
+                <a:r>
+                  <a:rPr lang="nb-NO" sz="1400" dirty="0"/>
+                  <a:t>d: 40; o: 1:4}</a:t>
+                </a:r>
+                <a:endParaRPr lang="en-US" sz="1400" dirty="0"/>
               </a:p>
             </p:txBody>
           </p:sp>
         </p:grpSp>
       </p:grpSp>
+      <p:sp>
+        <p:nvSpPr>
+          <p:cNvPr id="31" name="Rectangle 30">
+            <a:extLst>
+              <a:ext uri="{FF2B5EF4-FFF2-40B4-BE49-F238E27FC236}">
+                <a16:creationId xmlns:a16="http://schemas.microsoft.com/office/drawing/2014/main" id="{3C6E5EF3-41F0-4682-8429-2C4E0F9C2A4B}"/>
+              </a:ext>
+            </a:extLst>
+          </p:cNvPr>
+          <p:cNvSpPr/>
+          <p:nvPr/>
+        </p:nvSpPr>
+        <p:spPr>
+          <a:xfrm>
+            <a:off x="1640533" y="2182432"/>
+            <a:ext cx="7963592" cy="3474720"/>
+          </a:xfrm>
+          <a:prstGeom prst="rect">
+            <a:avLst/>
+          </a:prstGeom>
+          <a:noFill/>
+        </p:spPr>
+        <p:style>
+          <a:lnRef idx="2">
+            <a:schemeClr val="accent1">
+              <a:shade val="50000"/>
+            </a:schemeClr>
+          </a:lnRef>
+          <a:fillRef idx="1">
+            <a:schemeClr val="accent1"/>
+          </a:fillRef>
+          <a:effectRef idx="0">
+            <a:schemeClr val="accent1"/>
+          </a:effectRef>
+          <a:fontRef idx="minor">
+            <a:schemeClr val="lt1"/>
+          </a:fontRef>
+        </p:style>
+        <p:txBody>
+          <a:bodyPr rtlCol="0" anchor="ctr"/>
+          <a:lstStyle/>
+          <a:p>
+            <a:pPr algn="ctr"/>
+            <a:endParaRPr lang="en-US" dirty="0"/>
+          </a:p>
+        </p:txBody>
+      </p:sp>
+      <p:sp>
+        <p:nvSpPr>
+          <p:cNvPr id="32" name="TextBox 31">
+            <a:extLst>
+              <a:ext uri="{FF2B5EF4-FFF2-40B4-BE49-F238E27FC236}">
+                <a16:creationId xmlns:a16="http://schemas.microsoft.com/office/drawing/2014/main" id="{1CE06E7D-9F73-4FCA-ACDF-7E1B15134AD9}"/>
+              </a:ext>
+            </a:extLst>
+          </p:cNvPr>
+          <p:cNvSpPr txBox="1"/>
+          <p:nvPr/>
+        </p:nvSpPr>
+        <p:spPr>
+          <a:xfrm>
+            <a:off x="8587500" y="1864816"/>
+            <a:ext cx="1016625" cy="338554"/>
+          </a:xfrm>
+          <a:prstGeom prst="rect">
+            <a:avLst/>
+          </a:prstGeom>
+          <a:noFill/>
+        </p:spPr>
+        <p:txBody>
+          <a:bodyPr wrap="none" rtlCol="0">
+            <a:spAutoFit/>
+          </a:bodyPr>
+          <a:lstStyle/>
+          <a:p>
+            <a:r>
+              <a:rPr lang="en-US" sz="1600" b="1" dirty="0"/>
+              <a:t>Workload</a:t>
+            </a:r>
+          </a:p>
+        </p:txBody>
+      </p:sp>
+      <p:sp>
+        <p:nvSpPr>
+          <p:cNvPr id="36" name="Callout: Line with Accent Bar 35">
+            <a:extLst>
+              <a:ext uri="{FF2B5EF4-FFF2-40B4-BE49-F238E27FC236}">
+                <a16:creationId xmlns:a16="http://schemas.microsoft.com/office/drawing/2014/main" id="{25160258-DB09-4754-8BA7-EB487CC8E722}"/>
+              </a:ext>
+            </a:extLst>
+          </p:cNvPr>
+          <p:cNvSpPr/>
+          <p:nvPr/>
+        </p:nvSpPr>
+        <p:spPr>
+          <a:xfrm flipH="1">
+            <a:off x="210744" y="3524424"/>
+            <a:ext cx="1345276" cy="609010"/>
+          </a:xfrm>
+          <a:prstGeom prst="accentCallout1">
+            <a:avLst>
+              <a:gd name="adj1" fmla="val 18750"/>
+              <a:gd name="adj2" fmla="val -8333"/>
+              <a:gd name="adj3" fmla="val 110033"/>
+              <a:gd name="adj4" fmla="val -84521"/>
+            </a:avLst>
+          </a:prstGeom>
+          <a:solidFill>
+            <a:schemeClr val="bg1">
+              <a:lumMod val="95000"/>
+            </a:schemeClr>
+          </a:solidFill>
+          <a:ln>
+            <a:solidFill>
+              <a:srgbClr val="FF0000"/>
+            </a:solidFill>
+          </a:ln>
+        </p:spPr>
+        <p:style>
+          <a:lnRef idx="2">
+            <a:schemeClr val="accent1">
+              <a:shade val="50000"/>
+            </a:schemeClr>
+          </a:lnRef>
+          <a:fillRef idx="1">
+            <a:schemeClr val="accent1"/>
+          </a:fillRef>
+          <a:effectRef idx="0">
+            <a:schemeClr val="accent1"/>
+          </a:effectRef>
+          <a:fontRef idx="minor">
+            <a:schemeClr val="lt1"/>
+          </a:fontRef>
+        </p:style>
+        <p:txBody>
+          <a:bodyPr rtlCol="0" anchor="ctr"/>
+          <a:lstStyle/>
+          <a:p>
+            <a:pPr algn="ctr"/>
+            <a:r>
+              <a:rPr lang="en-US" dirty="0">
+                <a:solidFill>
+                  <a:schemeClr val="tx1"/>
+                </a:solidFill>
+              </a:rPr>
+              <a:t>Profile</a:t>
+            </a:r>
+          </a:p>
+        </p:txBody>
+      </p:sp>
       <p:grpSp>
         <p:nvGrpSpPr>
-          <p:cNvPr id="29" name="Group 28">
-            <a:extLst>
-              <a:ext uri="{FF2B5EF4-FFF2-40B4-BE49-F238E27FC236}">
-                <a16:creationId xmlns:a16="http://schemas.microsoft.com/office/drawing/2014/main" id="{7BA6EDAA-1419-48D2-8A4B-96BE2AFC5742}"/>
+          <p:cNvPr id="51" name="Group 50">
+            <a:extLst>
+              <a:ext uri="{FF2B5EF4-FFF2-40B4-BE49-F238E27FC236}">
+                <a16:creationId xmlns:a16="http://schemas.microsoft.com/office/drawing/2014/main" id="{EB3F28A7-1A7E-449E-AD4F-AA7372D23C6F}"/>
               </a:ext>
             </a:extLst>
           </p:cNvPr>
@@ -3631,18 +4154,18 @@
         </p:nvGrpSpPr>
         <p:grpSpPr>
           <a:xfrm>
-            <a:off x="5156662" y="2530532"/>
+            <a:off x="4455902" y="2491911"/>
             <a:ext cx="1878676" cy="2759826"/>
-            <a:chOff x="5156662" y="2530532"/>
+            <a:chOff x="2443942" y="2530532"/>
             <a:chExt cx="1878676" cy="2759826"/>
           </a:xfrm>
         </p:grpSpPr>
         <p:sp>
           <p:nvSpPr>
-            <p:cNvPr id="5" name="Rectangle 4">
+            <p:cNvPr id="52" name="Rectangle 51">
               <a:extLst>
                 <a:ext uri="{FF2B5EF4-FFF2-40B4-BE49-F238E27FC236}">
-                  <a16:creationId xmlns:a16="http://schemas.microsoft.com/office/drawing/2014/main" id="{90517D1D-5EE6-4CAA-A87D-E2E157A41CDA}"/>
+                  <a16:creationId xmlns:a16="http://schemas.microsoft.com/office/drawing/2014/main" id="{593AA9A5-2B3D-48E4-A9A1-FC100370B1BC}"/>
                 </a:ext>
               </a:extLst>
             </p:cNvPr>
@@ -3651,7 +4174,7 @@
           </p:nvSpPr>
           <p:spPr>
             <a:xfrm>
-              <a:off x="5156662" y="2530532"/>
+              <a:off x="2443942" y="2530532"/>
               <a:ext cx="1878676" cy="2759826"/>
             </a:xfrm>
             <a:prstGeom prst="rect">
@@ -3691,10 +4214,10 @@
         </p:sp>
         <p:sp>
           <p:nvSpPr>
-            <p:cNvPr id="8" name="TextBox 7">
+            <p:cNvPr id="53" name="TextBox 52">
               <a:extLst>
                 <a:ext uri="{FF2B5EF4-FFF2-40B4-BE49-F238E27FC236}">
-                  <a16:creationId xmlns:a16="http://schemas.microsoft.com/office/drawing/2014/main" id="{111700FF-3B38-458F-8169-9BFC6222F89D}"/>
+                  <a16:creationId xmlns:a16="http://schemas.microsoft.com/office/drawing/2014/main" id="{9E881242-1BA1-4BA1-A9BD-288F9550FF55}"/>
                 </a:ext>
               </a:extLst>
             </p:cNvPr>
@@ -3703,7 +4226,7 @@
           </p:nvSpPr>
           <p:spPr>
             <a:xfrm>
-              <a:off x="5507570" y="2914996"/>
+              <a:off x="2794850" y="2914996"/>
               <a:ext cx="1176861" cy="307777"/>
             </a:xfrm>
             <a:prstGeom prst="rect">
@@ -3719,17 +4242,17 @@
             <a:p>
               <a:r>
                 <a:rPr lang="en-US" sz="1400" dirty="0"/>
-                <a:t>Component 2</a:t>
+                <a:t>Component 1</a:t>
               </a:r>
             </a:p>
           </p:txBody>
         </p:sp>
         <p:sp>
           <p:nvSpPr>
-            <p:cNvPr id="11" name="TextBox 10">
+            <p:cNvPr id="54" name="TextBox 53">
               <a:extLst>
                 <a:ext uri="{FF2B5EF4-FFF2-40B4-BE49-F238E27FC236}">
-                  <a16:creationId xmlns:a16="http://schemas.microsoft.com/office/drawing/2014/main" id="{22D70BD7-744A-4676-AED2-9DCD7C3BD76A}"/>
+                  <a16:creationId xmlns:a16="http://schemas.microsoft.com/office/drawing/2014/main" id="{8F1D4D6A-E82C-441F-85C7-3D9DCB9F9C93}"/>
                 </a:ext>
               </a:extLst>
             </p:cNvPr>
@@ -3738,7 +4261,7 @@
           </p:nvSpPr>
           <p:spPr>
             <a:xfrm>
-              <a:off x="5609168" y="4848141"/>
+              <a:off x="2896448" y="4848141"/>
               <a:ext cx="973664" cy="307777"/>
             </a:xfrm>
             <a:prstGeom prst="rect">
@@ -3761,10 +4284,10 @@
         </p:sp>
         <p:grpSp>
           <p:nvGrpSpPr>
-            <p:cNvPr id="20" name="Group 19">
+            <p:cNvPr id="55" name="Group 54">
               <a:extLst>
                 <a:ext uri="{FF2B5EF4-FFF2-40B4-BE49-F238E27FC236}">
-                  <a16:creationId xmlns:a16="http://schemas.microsoft.com/office/drawing/2014/main" id="{1E007172-0E34-4EA1-9E49-ABF937B3F534}"/>
+                  <a16:creationId xmlns:a16="http://schemas.microsoft.com/office/drawing/2014/main" id="{AEF79EB9-C7D3-4B98-A9C0-4A54C562541A}"/>
                 </a:ext>
               </a:extLst>
             </p:cNvPr>
@@ -3773,18 +4296,18 @@
           </p:nvGrpSpPr>
           <p:grpSpPr>
             <a:xfrm>
-              <a:off x="5628316" y="3494603"/>
-              <a:ext cx="935369" cy="964277"/>
-              <a:chOff x="329769" y="1695796"/>
-              <a:chExt cx="935369" cy="964277"/>
+              <a:off x="2592433" y="3563391"/>
+              <a:ext cx="1581694" cy="1036114"/>
+              <a:chOff x="6606" y="1695796"/>
+              <a:chExt cx="1581694" cy="1036114"/>
             </a:xfrm>
           </p:grpSpPr>
           <p:sp>
             <p:nvSpPr>
-              <p:cNvPr id="21" name="Rectangle 20">
+              <p:cNvPr id="56" name="Rectangle 55">
                 <a:extLst>
                   <a:ext uri="{FF2B5EF4-FFF2-40B4-BE49-F238E27FC236}">
-                    <a16:creationId xmlns:a16="http://schemas.microsoft.com/office/drawing/2014/main" id="{91B96D3C-2509-4029-AF07-2B1E3423F96A}"/>
+                    <a16:creationId xmlns:a16="http://schemas.microsoft.com/office/drawing/2014/main" id="{5C0924E5-1CC4-484F-8CE8-627F67DC3EDE}"/>
                   </a:ext>
                 </a:extLst>
               </p:cNvPr>
@@ -3793,8 +4316,8 @@
             </p:nvSpPr>
             <p:spPr>
               <a:xfrm>
-                <a:off x="329769" y="1695796"/>
-                <a:ext cx="935369" cy="964277"/>
+                <a:off x="6606" y="1695796"/>
+                <a:ext cx="1581694" cy="1036114"/>
               </a:xfrm>
               <a:prstGeom prst="rect">
                 <a:avLst/>
@@ -3833,10 +4356,10 @@
           </p:sp>
           <p:sp>
             <p:nvSpPr>
-              <p:cNvPr id="22" name="TextBox 21">
+              <p:cNvPr id="57" name="TextBox 56">
                 <a:extLst>
                   <a:ext uri="{FF2B5EF4-FFF2-40B4-BE49-F238E27FC236}">
-                    <a16:creationId xmlns:a16="http://schemas.microsoft.com/office/drawing/2014/main" id="{AE7AE7AF-5DD3-44F1-9B00-89ABF963B1CA}"/>
+                    <a16:creationId xmlns:a16="http://schemas.microsoft.com/office/drawing/2014/main" id="{F7E91761-291A-4FAB-AD93-FF2E3B2F7182}"/>
                   </a:ext>
                 </a:extLst>
               </p:cNvPr>
@@ -3845,7 +4368,7 @@
             </p:nvSpPr>
             <p:spPr>
               <a:xfrm>
-                <a:off x="576078" y="2222755"/>
+                <a:off x="576078" y="2359362"/>
                 <a:ext cx="457176" cy="307777"/>
               </a:xfrm>
               <a:prstGeom prst="rect">
@@ -3873,10 +4396,10 @@
           </p:sp>
           <p:sp>
             <p:nvSpPr>
-              <p:cNvPr id="23" name="TextBox 22">
+              <p:cNvPr id="58" name="TextBox 57">
                 <a:extLst>
                   <a:ext uri="{FF2B5EF4-FFF2-40B4-BE49-F238E27FC236}">
-                    <a16:creationId xmlns:a16="http://schemas.microsoft.com/office/drawing/2014/main" id="{417CBF60-6015-41E3-BD38-C9DD3E7D9C06}"/>
+                    <a16:creationId xmlns:a16="http://schemas.microsoft.com/office/drawing/2014/main" id="{5673AFD6-428C-463B-BC79-C1959890BD38}"/>
                   </a:ext>
                 </a:extLst>
               </p:cNvPr>
@@ -3885,8 +4408,8 @@
             </p:nvSpPr>
             <p:spPr>
               <a:xfrm>
-                <a:off x="427801" y="1837494"/>
-                <a:ext cx="740203" cy="307777"/>
+                <a:off x="243455" y="1771372"/>
+                <a:ext cx="994183" cy="523220"/>
               </a:xfrm>
               <a:prstGeom prst="rect">
                 <a:avLst/>
@@ -3906,8 +4429,19 @@
               <a:p>
                 <a:r>
                   <a:rPr lang="en-US" sz="1400" dirty="0"/>
-                  <a:t>  Large  </a:t>
+                  <a:t>  </a:t>
                 </a:r>
+                <a:r>
+                  <a:rPr lang="nb-NO" sz="1400" dirty="0"/>
+                  <a:t>{c: 4; r: 8; </a:t>
+                </a:r>
+              </a:p>
+              <a:p>
+                <a:r>
+                  <a:rPr lang="nb-NO" sz="1400" dirty="0"/>
+                  <a:t>       d: 80;}</a:t>
+                </a:r>
+                <a:endParaRPr lang="en-US" sz="1400" dirty="0"/>
               </a:p>
             </p:txBody>
           </p:sp>
@@ -3915,10 +4449,10 @@
       </p:grpSp>
       <p:grpSp>
         <p:nvGrpSpPr>
-          <p:cNvPr id="30" name="Group 29">
-            <a:extLst>
-              <a:ext uri="{FF2B5EF4-FFF2-40B4-BE49-F238E27FC236}">
-                <a16:creationId xmlns:a16="http://schemas.microsoft.com/office/drawing/2014/main" id="{51C58785-FA54-4E53-85F4-D7639100C72D}"/>
+          <p:cNvPr id="59" name="Group 58">
+            <a:extLst>
+              <a:ext uri="{FF2B5EF4-FFF2-40B4-BE49-F238E27FC236}">
+                <a16:creationId xmlns:a16="http://schemas.microsoft.com/office/drawing/2014/main" id="{5E2954F3-3001-414A-9349-39D0F69BCAC1}"/>
               </a:ext>
             </a:extLst>
           </p:cNvPr>
@@ -3927,18 +4461,18 @@
         </p:nvGrpSpPr>
         <p:grpSpPr>
           <a:xfrm>
-            <a:off x="7869382" y="2530532"/>
+            <a:off x="7398484" y="2449016"/>
             <a:ext cx="1878676" cy="2759826"/>
-            <a:chOff x="7869382" y="2530532"/>
+            <a:chOff x="2443942" y="2530532"/>
             <a:chExt cx="1878676" cy="2759826"/>
           </a:xfrm>
         </p:grpSpPr>
         <p:sp>
           <p:nvSpPr>
-            <p:cNvPr id="6" name="Rectangle 5">
+            <p:cNvPr id="60" name="Rectangle 59">
               <a:extLst>
                 <a:ext uri="{FF2B5EF4-FFF2-40B4-BE49-F238E27FC236}">
-                  <a16:creationId xmlns:a16="http://schemas.microsoft.com/office/drawing/2014/main" id="{191BD8F4-B4F5-4D9E-A926-345F25296EC9}"/>
+                  <a16:creationId xmlns:a16="http://schemas.microsoft.com/office/drawing/2014/main" id="{CF00B967-2B04-4D2C-A9A3-140CDD36897F}"/>
                 </a:ext>
               </a:extLst>
             </p:cNvPr>
@@ -3947,7 +4481,7 @@
           </p:nvSpPr>
           <p:spPr>
             <a:xfrm>
-              <a:off x="7869382" y="2530532"/>
+              <a:off x="2443942" y="2530532"/>
               <a:ext cx="1878676" cy="2759826"/>
             </a:xfrm>
             <a:prstGeom prst="rect">
@@ -3987,10 +4521,10 @@
         </p:sp>
         <p:sp>
           <p:nvSpPr>
-            <p:cNvPr id="9" name="TextBox 8">
+            <p:cNvPr id="61" name="TextBox 60">
               <a:extLst>
                 <a:ext uri="{FF2B5EF4-FFF2-40B4-BE49-F238E27FC236}">
-                  <a16:creationId xmlns:a16="http://schemas.microsoft.com/office/drawing/2014/main" id="{64011D28-EDB7-42ED-8BB3-F853712F3C4A}"/>
+                  <a16:creationId xmlns:a16="http://schemas.microsoft.com/office/drawing/2014/main" id="{2D3CB07B-9248-4815-BB38-5CAD2130BFCA}"/>
                 </a:ext>
               </a:extLst>
             </p:cNvPr>
@@ -3999,7 +4533,7 @@
           </p:nvSpPr>
           <p:spPr>
             <a:xfrm>
-              <a:off x="8220290" y="2914996"/>
+              <a:off x="2794850" y="2914996"/>
               <a:ext cx="1176861" cy="307777"/>
             </a:xfrm>
             <a:prstGeom prst="rect">
@@ -4015,17 +4549,17 @@
             <a:p>
               <a:r>
                 <a:rPr lang="en-US" sz="1400" dirty="0"/>
-                <a:t>Component 3</a:t>
+                <a:t>Component 1</a:t>
               </a:r>
             </a:p>
           </p:txBody>
         </p:sp>
         <p:sp>
           <p:nvSpPr>
-            <p:cNvPr id="10" name="TextBox 9">
+            <p:cNvPr id="62" name="TextBox 61">
               <a:extLst>
                 <a:ext uri="{FF2B5EF4-FFF2-40B4-BE49-F238E27FC236}">
-                  <a16:creationId xmlns:a16="http://schemas.microsoft.com/office/drawing/2014/main" id="{7A6D094C-780D-4273-9279-37C79FAECF41}"/>
+                  <a16:creationId xmlns:a16="http://schemas.microsoft.com/office/drawing/2014/main" id="{2B100C28-5587-49C7-B9A0-78DF12FCB765}"/>
                 </a:ext>
               </a:extLst>
             </p:cNvPr>
@@ -4034,7 +4568,7 @@
           </p:nvSpPr>
           <p:spPr>
             <a:xfrm>
-              <a:off x="8321888" y="4848141"/>
+              <a:off x="2896448" y="4848141"/>
               <a:ext cx="973664" cy="307777"/>
             </a:xfrm>
             <a:prstGeom prst="rect">
@@ -4057,10 +4591,10 @@
         </p:sp>
         <p:grpSp>
           <p:nvGrpSpPr>
-            <p:cNvPr id="24" name="Group 23">
+            <p:cNvPr id="63" name="Group 62">
               <a:extLst>
                 <a:ext uri="{FF2B5EF4-FFF2-40B4-BE49-F238E27FC236}">
-                  <a16:creationId xmlns:a16="http://schemas.microsoft.com/office/drawing/2014/main" id="{9FB6A5BB-E74A-4801-843F-CA98B5659CB0}"/>
+                  <a16:creationId xmlns:a16="http://schemas.microsoft.com/office/drawing/2014/main" id="{F1698988-0FDC-4C64-B196-0498B5646902}"/>
                 </a:ext>
               </a:extLst>
             </p:cNvPr>
@@ -4069,18 +4603,18 @@
           </p:nvGrpSpPr>
           <p:grpSpPr>
             <a:xfrm>
-              <a:off x="8341036" y="3635228"/>
-              <a:ext cx="935369" cy="964277"/>
-              <a:chOff x="329769" y="1695796"/>
-              <a:chExt cx="935369" cy="964277"/>
+              <a:off x="2592433" y="3563391"/>
+              <a:ext cx="1581694" cy="1036114"/>
+              <a:chOff x="6606" y="1695796"/>
+              <a:chExt cx="1581694" cy="1036114"/>
             </a:xfrm>
           </p:grpSpPr>
           <p:sp>
             <p:nvSpPr>
-              <p:cNvPr id="25" name="Rectangle 24">
+              <p:cNvPr id="64" name="Rectangle 63">
                 <a:extLst>
                   <a:ext uri="{FF2B5EF4-FFF2-40B4-BE49-F238E27FC236}">
-                    <a16:creationId xmlns:a16="http://schemas.microsoft.com/office/drawing/2014/main" id="{DA576EA3-167A-4232-A73A-1F5FAA95CE61}"/>
+                    <a16:creationId xmlns:a16="http://schemas.microsoft.com/office/drawing/2014/main" id="{6C138C2D-A53E-41CE-9818-E4A36AB93DD9}"/>
                   </a:ext>
                 </a:extLst>
               </p:cNvPr>
@@ -4089,8 +4623,8 @@
             </p:nvSpPr>
             <p:spPr>
               <a:xfrm>
-                <a:off x="329769" y="1695796"/>
-                <a:ext cx="935369" cy="964277"/>
+                <a:off x="6606" y="1695796"/>
+                <a:ext cx="1581694" cy="1036114"/>
               </a:xfrm>
               <a:prstGeom prst="rect">
                 <a:avLst/>
@@ -4129,10 +4663,10 @@
           </p:sp>
           <p:sp>
             <p:nvSpPr>
-              <p:cNvPr id="26" name="TextBox 25">
+              <p:cNvPr id="65" name="TextBox 64">
                 <a:extLst>
                   <a:ext uri="{FF2B5EF4-FFF2-40B4-BE49-F238E27FC236}">
-                    <a16:creationId xmlns:a16="http://schemas.microsoft.com/office/drawing/2014/main" id="{F69D530B-DA69-40DE-99C5-D2DEDFB6A851}"/>
+                    <a16:creationId xmlns:a16="http://schemas.microsoft.com/office/drawing/2014/main" id="{EED90C21-4969-46B8-835E-4C0CA5F2C9D3}"/>
                   </a:ext>
                 </a:extLst>
               </p:cNvPr>
@@ -4141,7 +4675,7 @@
             </p:nvSpPr>
             <p:spPr>
               <a:xfrm>
-                <a:off x="576078" y="2222755"/>
+                <a:off x="576078" y="2359362"/>
                 <a:ext cx="457176" cy="307777"/>
               </a:xfrm>
               <a:prstGeom prst="rect">
@@ -4169,10 +4703,10 @@
           </p:sp>
           <p:sp>
             <p:nvSpPr>
-              <p:cNvPr id="27" name="TextBox 26">
+              <p:cNvPr id="66" name="TextBox 65">
                 <a:extLst>
                   <a:ext uri="{FF2B5EF4-FFF2-40B4-BE49-F238E27FC236}">
-                    <a16:creationId xmlns:a16="http://schemas.microsoft.com/office/drawing/2014/main" id="{DEAAAE74-3F2F-4CE4-9E7F-A34DF5A8FE0F}"/>
+                    <a16:creationId xmlns:a16="http://schemas.microsoft.com/office/drawing/2014/main" id="{F45E0822-4448-4274-B954-1706F03CDD16}"/>
                   </a:ext>
                 </a:extLst>
               </p:cNvPr>
@@ -4181,8 +4715,8 @@
             </p:nvSpPr>
             <p:spPr>
               <a:xfrm>
-                <a:off x="427801" y="1837494"/>
-                <a:ext cx="740203" cy="307777"/>
+                <a:off x="243455" y="1771372"/>
+                <a:ext cx="1107996" cy="523220"/>
               </a:xfrm>
               <a:prstGeom prst="rect">
                 <a:avLst/>
@@ -4202,8 +4736,19 @@
               <a:p>
                 <a:r>
                   <a:rPr lang="en-US" sz="1400" dirty="0"/>
-                  <a:t>  Large  </a:t>
+                  <a:t>  </a:t>
                 </a:r>
+                <a:r>
+                  <a:rPr lang="nb-NO" sz="1400" dirty="0"/>
+                  <a:t>{c: 4; r: 12; </a:t>
+                </a:r>
+              </a:p>
+              <a:p>
+                <a:r>
+                  <a:rPr lang="nb-NO" sz="1400" dirty="0"/>
+                  <a:t>  d: 80; l: 10}</a:t>
+                </a:r>
+                <a:endParaRPr lang="en-US" sz="1400" dirty="0"/>
               </a:p>
             </p:txBody>
           </p:sp>
@@ -4211,10 +4756,10 @@
       </p:grpSp>
       <p:sp>
         <p:nvSpPr>
-          <p:cNvPr id="31" name="Rectangle 30">
-            <a:extLst>
-              <a:ext uri="{FF2B5EF4-FFF2-40B4-BE49-F238E27FC236}">
-                <a16:creationId xmlns:a16="http://schemas.microsoft.com/office/drawing/2014/main" id="{3C6E5EF3-41F0-4682-8429-2C4E0F9C2A4B}"/>
+          <p:cNvPr id="37" name="Callout: Line with Accent Bar 36">
+            <a:extLst>
+              <a:ext uri="{FF2B5EF4-FFF2-40B4-BE49-F238E27FC236}">
+                <a16:creationId xmlns:a16="http://schemas.microsoft.com/office/drawing/2014/main" id="{064385EA-CE0D-4866-B5C8-F642969F5E32}"/>
               </a:ext>
             </a:extLst>
           </p:cNvPr>
@@ -4223,97 +4768,15 @@
         </p:nvSpPr>
         <p:spPr>
           <a:xfrm>
-            <a:off x="2111433" y="2211185"/>
-            <a:ext cx="7963592" cy="3474720"/>
-          </a:xfrm>
-          <a:prstGeom prst="rect">
-            <a:avLst/>
-          </a:prstGeom>
-          <a:noFill/>
-        </p:spPr>
-        <p:style>
-          <a:lnRef idx="2">
-            <a:schemeClr val="accent1">
-              <a:shade val="50000"/>
-            </a:schemeClr>
-          </a:lnRef>
-          <a:fillRef idx="1">
-            <a:schemeClr val="accent1"/>
-          </a:fillRef>
-          <a:effectRef idx="0">
-            <a:schemeClr val="accent1"/>
-          </a:effectRef>
-          <a:fontRef idx="minor">
-            <a:schemeClr val="lt1"/>
-          </a:fontRef>
-        </p:style>
-        <p:txBody>
-          <a:bodyPr rtlCol="0" anchor="ctr"/>
-          <a:lstStyle/>
-          <a:p>
-            <a:pPr algn="ctr"/>
-            <a:endParaRPr lang="en-US" dirty="0"/>
-          </a:p>
-        </p:txBody>
-      </p:sp>
-      <p:sp>
-        <p:nvSpPr>
-          <p:cNvPr id="32" name="TextBox 31">
-            <a:extLst>
-              <a:ext uri="{FF2B5EF4-FFF2-40B4-BE49-F238E27FC236}">
-                <a16:creationId xmlns:a16="http://schemas.microsoft.com/office/drawing/2014/main" id="{1CE06E7D-9F73-4FCA-ACDF-7E1B15134AD9}"/>
-              </a:ext>
-            </a:extLst>
-          </p:cNvPr>
-          <p:cNvSpPr txBox="1"/>
-          <p:nvPr/>
-        </p:nvSpPr>
-        <p:spPr>
-          <a:xfrm>
-            <a:off x="9058400" y="1893569"/>
-            <a:ext cx="1016625" cy="338554"/>
-          </a:xfrm>
-          <a:prstGeom prst="rect">
-            <a:avLst/>
-          </a:prstGeom>
-          <a:noFill/>
-        </p:spPr>
-        <p:txBody>
-          <a:bodyPr wrap="none" rtlCol="0">
-            <a:spAutoFit/>
-          </a:bodyPr>
-          <a:lstStyle/>
-          <a:p>
-            <a:r>
-              <a:rPr lang="en-US" sz="1600" b="1" dirty="0"/>
-              <a:t>Workload</a:t>
-            </a:r>
-          </a:p>
-        </p:txBody>
-      </p:sp>
-      <p:sp>
-        <p:nvSpPr>
-          <p:cNvPr id="36" name="Callout: Line with Accent Bar 35">
-            <a:extLst>
-              <a:ext uri="{FF2B5EF4-FFF2-40B4-BE49-F238E27FC236}">
-                <a16:creationId xmlns:a16="http://schemas.microsoft.com/office/drawing/2014/main" id="{25160258-DB09-4754-8BA7-EB487CC8E722}"/>
-              </a:ext>
-            </a:extLst>
-          </p:cNvPr>
-          <p:cNvSpPr/>
-          <p:nvPr/>
-        </p:nvSpPr>
-        <p:spPr>
-          <a:xfrm flipH="1">
-            <a:off x="681644" y="3553177"/>
-            <a:ext cx="1345276" cy="609010"/>
+            <a:off x="9748812" y="2886243"/>
+            <a:ext cx="1762298" cy="869373"/>
           </a:xfrm>
           <a:prstGeom prst="accentCallout1">
             <a:avLst>
               <a:gd name="adj1" fmla="val 18750"/>
               <a:gd name="adj2" fmla="val -8333"/>
-              <a:gd name="adj3" fmla="val 110033"/>
-              <a:gd name="adj4" fmla="val -84521"/>
+              <a:gd name="adj3" fmla="val 81583"/>
+              <a:gd name="adj4" fmla="val -53218"/>
             </a:avLst>
           </a:prstGeom>
           <a:solidFill>
@@ -4354,74 +4817,6 @@
                   <a:schemeClr val="tx1"/>
                 </a:solidFill>
               </a:rPr>
-              <a:t>Profile</a:t>
-            </a:r>
-          </a:p>
-        </p:txBody>
-      </p:sp>
-      <p:sp>
-        <p:nvSpPr>
-          <p:cNvPr id="37" name="Callout: Line with Accent Bar 36">
-            <a:extLst>
-              <a:ext uri="{FF2B5EF4-FFF2-40B4-BE49-F238E27FC236}">
-                <a16:creationId xmlns:a16="http://schemas.microsoft.com/office/drawing/2014/main" id="{064385EA-CE0D-4866-B5C8-F642969F5E32}"/>
-              </a:ext>
-            </a:extLst>
-          </p:cNvPr>
-          <p:cNvSpPr/>
-          <p:nvPr/>
-        </p:nvSpPr>
-        <p:spPr>
-          <a:xfrm>
-            <a:off x="10219712" y="2914996"/>
-            <a:ext cx="1762298" cy="869373"/>
-          </a:xfrm>
-          <a:prstGeom prst="accentCallout1">
-            <a:avLst>
-              <a:gd name="adj1" fmla="val 18750"/>
-              <a:gd name="adj2" fmla="val -8333"/>
-              <a:gd name="adj3" fmla="val 99113"/>
-              <a:gd name="adj4" fmla="val -64748"/>
-            </a:avLst>
-          </a:prstGeom>
-          <a:solidFill>
-            <a:schemeClr val="bg1">
-              <a:lumMod val="95000"/>
-            </a:schemeClr>
-          </a:solidFill>
-          <a:ln>
-            <a:solidFill>
-              <a:srgbClr val="FF0000"/>
-            </a:solidFill>
-          </a:ln>
-        </p:spPr>
-        <p:style>
-          <a:lnRef idx="2">
-            <a:schemeClr val="accent1">
-              <a:shade val="50000"/>
-            </a:schemeClr>
-          </a:lnRef>
-          <a:fillRef idx="1">
-            <a:schemeClr val="accent1"/>
-          </a:fillRef>
-          <a:effectRef idx="0">
-            <a:schemeClr val="accent1"/>
-          </a:effectRef>
-          <a:fontRef idx="minor">
-            <a:schemeClr val="lt1"/>
-          </a:fontRef>
-        </p:style>
-        <p:txBody>
-          <a:bodyPr rtlCol="0" anchor="ctr"/>
-          <a:lstStyle/>
-          <a:p>
-            <a:pPr algn="ctr"/>
-            <a:r>
-              <a:rPr lang="en-US" dirty="0">
-                <a:solidFill>
-                  <a:schemeClr val="tx1"/>
-                </a:solidFill>
-              </a:rPr>
               <a:t>Workload </a:t>
             </a:r>
             <a:r>
@@ -4432,11 +4827,91 @@
               </a:rPr>
               <a:t>flavour</a:t>
             </a:r>
-            <a:endParaRPr lang="en-US" dirty="0">
-              <a:solidFill>
-                <a:schemeClr val="tx1"/>
-              </a:solidFill>
-            </a:endParaRPr>
+            <a:r>
+              <a:rPr lang="en-US" dirty="0">
+                <a:solidFill>
+                  <a:schemeClr val="tx1"/>
+                </a:solidFill>
+              </a:rPr>
+              <a:t> spec</a:t>
+            </a:r>
+          </a:p>
+        </p:txBody>
+      </p:sp>
+      <p:sp>
+        <p:nvSpPr>
+          <p:cNvPr id="2" name="TextBox 1">
+            <a:extLst>
+              <a:ext uri="{FF2B5EF4-FFF2-40B4-BE49-F238E27FC236}">
+                <a16:creationId xmlns:a16="http://schemas.microsoft.com/office/drawing/2014/main" id="{E0F5FB46-05A4-4547-8A38-FA5BDAB3ACB1}"/>
+              </a:ext>
+            </a:extLst>
+          </p:cNvPr>
+          <p:cNvSpPr txBox="1"/>
+          <p:nvPr/>
+        </p:nvSpPr>
+        <p:spPr>
+          <a:xfrm>
+            <a:off x="9688638" y="4820850"/>
+            <a:ext cx="2295821" cy="861774"/>
+          </a:xfrm>
+          <a:prstGeom prst="rect">
+            <a:avLst/>
+          </a:prstGeom>
+          <a:noFill/>
+        </p:spPr>
+        <p:txBody>
+          <a:bodyPr wrap="none" rtlCol="0">
+            <a:spAutoFit/>
+          </a:bodyPr>
+          <a:lstStyle/>
+          <a:p>
+            <a:r>
+              <a:rPr lang="en-US" sz="1000" dirty="0"/>
+              <a:t>c </a:t>
+            </a:r>
+            <a:r>
+              <a:rPr lang="en-US" sz="1000" dirty="0" err="1"/>
+              <a:t>cpu</a:t>
+            </a:r>
+            <a:endParaRPr lang="en-US" sz="1000" dirty="0"/>
+          </a:p>
+          <a:p>
+            <a:r>
+              <a:rPr lang="en-US" sz="1000" dirty="0"/>
+              <a:t>r memory in Gi</a:t>
+            </a:r>
+          </a:p>
+          <a:p>
+            <a:r>
+              <a:rPr lang="en-US" sz="1000" dirty="0"/>
+              <a:t>d storage-permanent in Gi</a:t>
+            </a:r>
+          </a:p>
+          <a:p>
+            <a:r>
+              <a:rPr lang="en-US" sz="1000" dirty="0"/>
+              <a:t>o </a:t>
+            </a:r>
+            <a:r>
+              <a:rPr lang="en-US" sz="1000" dirty="0" err="1"/>
+              <a:t>cpu</a:t>
+            </a:r>
+            <a:r>
+              <a:rPr lang="en-US" sz="1000" dirty="0"/>
+              <a:t> allocation (over-subscription ratio)</a:t>
+            </a:r>
+          </a:p>
+          <a:p>
+            <a:r>
+              <a:rPr lang="en-US" sz="1000" dirty="0"/>
+              <a:t>l Latency (maximum) in </a:t>
+            </a:r>
+            <a:r>
+              <a:rPr lang="en-US" sz="1000" dirty="0" err="1"/>
+              <a:t>ms</a:t>
+            </a:r>
+            <a:endParaRPr lang="en-US" sz="1000" dirty="0"/>
           </a:p>
         </p:txBody>
       </p:sp>

</xml_diff>